<commit_message>
Add link to PDF archive
</commit_message>
<xml_diff>
--- a/slides-0-intro-jpmorgan.pptx
+++ b/slides-0-intro-jpmorgan.pptx
@@ -234,7 +234,7 @@
           <a:p>
             <a:fld id="{376AB0CB-9854-425E-A483-57B6433705E7}" type="datetimeFigureOut">
               <a:rPr lang="en-US" smtClean="0"/>
-              <a:t>10/26/2017</a:t>
+              <a:t>10/27/2017</a:t>
             </a:fld>
             <a:endParaRPr lang="en-US"/>
           </a:p>
@@ -3635,8 +3635,8 @@
         </p:nvSpPr>
         <p:spPr>
           <a:xfrm>
-            <a:off x="216024" y="4731990"/>
-            <a:ext cx="8244408" cy="338554"/>
+            <a:off x="216024" y="4515966"/>
+            <a:ext cx="8244408" cy="584775"/>
           </a:xfrm>
           <a:prstGeom prst="rect">
             <a:avLst/>
@@ -3654,7 +3654,13 @@
             </a:r>
             <a:r>
               <a:rPr lang="en-US" sz="1600" dirty="0" smtClean="0"/>
-              <a:t>github.com/stevesimmons/pyconuk2017-pandas-and-dask-from-the-inside</a:t>
+              <a:t>github.com/stevesimmons/pyconuk2017-pandas-and-dask</a:t>
+            </a:r>
+          </a:p>
+          <a:p>
+            <a:r>
+              <a:rPr lang="en-US" sz="1600" dirty="0"/>
+              <a:t>http://www.stevesimmons.com/pyconuk2017-pdfs.zip</a:t>
             </a:r>
             <a:endParaRPr lang="en-US" sz="1600" dirty="0"/>
           </a:p>
@@ -3754,23 +3760,7 @@
             </a:pPr>
             <a:r>
               <a:rPr lang="en-US" sz="2400" dirty="0" smtClean="0"/>
-              <a:t>Welcome and introduction	</a:t>
-            </a:r>
-            <a:r>
-              <a:rPr lang="en-US" sz="2400" dirty="0" smtClean="0"/>
-              <a:t>  </a:t>
-            </a:r>
-            <a:r>
-              <a:rPr lang="en-US" sz="2400" dirty="0" smtClean="0"/>
-              <a:t>5</a:t>
-            </a:r>
-            <a:r>
-              <a:rPr lang="en-US" sz="2400" dirty="0" smtClean="0"/>
-              <a:t> </a:t>
-            </a:r>
-            <a:r>
-              <a:rPr lang="en-US" sz="2400" dirty="0" smtClean="0"/>
-              <a:t>mins</a:t>
+              <a:t>Welcome and introduction	  5 mins</a:t>
             </a:r>
           </a:p>
           <a:p>
@@ -3781,15 +3771,7 @@
             </a:pPr>
             <a:r>
               <a:rPr lang="en-US" sz="2400" dirty="0" smtClean="0"/>
-              <a:t>Pandas from the Inside	</a:t>
-            </a:r>
-            <a:r>
-              <a:rPr lang="en-US" sz="2400" dirty="0" smtClean="0"/>
-              <a:t>75 </a:t>
-            </a:r>
-            <a:r>
-              <a:rPr lang="en-US" sz="2400" dirty="0" smtClean="0"/>
-              <a:t>mins</a:t>
+              <a:t>Pandas from the Inside	75 mins</a:t>
             </a:r>
           </a:p>
           <a:p>
@@ -3819,15 +3801,7 @@
             </a:pPr>
             <a:r>
               <a:rPr lang="en-US" sz="2400" dirty="0" smtClean="0"/>
-              <a:t>Pandas 2.0 </a:t>
-            </a:r>
-            <a:r>
-              <a:rPr lang="en-US" sz="2400" dirty="0" smtClean="0"/>
-              <a:t>– where next?</a:t>
-            </a:r>
-            <a:r>
-              <a:rPr lang="en-US" sz="2400" dirty="0" smtClean="0"/>
-              <a:t>	10 mins</a:t>
+              <a:t>Pandas 2.0 – where next?	10 mins</a:t>
             </a:r>
           </a:p>
         </p:txBody>

</xml_diff>